<commit_message>
: staging changes to website
</commit_message>
<xml_diff>
--- a/content/docs/latest/parent-pom/_attachments/parent-pom.pptx
+++ b/content/docs/latest/parent-pom/_attachments/parent-pom.pptx
@@ -261,7 +261,7 @@
           <a:p>
             <a:fld id="{F63ACD98-5124-4B8B-B052-6751B42D2BBE}" type="datetimeFigureOut">
               <a:rPr lang="en-GB" smtClean="0"/>
-              <a:t>29/01/2020</a:t>
+              <a:t>18/03/2020</a:t>
             </a:fld>
             <a:endParaRPr lang="en-GB"/>
           </a:p>
@@ -461,7 +461,7 @@
           <a:p>
             <a:fld id="{F63ACD98-5124-4B8B-B052-6751B42D2BBE}" type="datetimeFigureOut">
               <a:rPr lang="en-GB" smtClean="0"/>
-              <a:t>29/01/2020</a:t>
+              <a:t>18/03/2020</a:t>
             </a:fld>
             <a:endParaRPr lang="en-GB"/>
           </a:p>
@@ -671,7 +671,7 @@
           <a:p>
             <a:fld id="{F63ACD98-5124-4B8B-B052-6751B42D2BBE}" type="datetimeFigureOut">
               <a:rPr lang="en-GB" smtClean="0"/>
-              <a:t>29/01/2020</a:t>
+              <a:t>18/03/2020</a:t>
             </a:fld>
             <a:endParaRPr lang="en-GB"/>
           </a:p>
@@ -871,7 +871,7 @@
           <a:p>
             <a:fld id="{F63ACD98-5124-4B8B-B052-6751B42D2BBE}" type="datetimeFigureOut">
               <a:rPr lang="en-GB" smtClean="0"/>
-              <a:t>29/01/2020</a:t>
+              <a:t>18/03/2020</a:t>
             </a:fld>
             <a:endParaRPr lang="en-GB"/>
           </a:p>
@@ -1147,7 +1147,7 @@
           <a:p>
             <a:fld id="{F63ACD98-5124-4B8B-B052-6751B42D2BBE}" type="datetimeFigureOut">
               <a:rPr lang="en-GB" smtClean="0"/>
-              <a:t>29/01/2020</a:t>
+              <a:t>18/03/2020</a:t>
             </a:fld>
             <a:endParaRPr lang="en-GB"/>
           </a:p>
@@ -1415,7 +1415,7 @@
           <a:p>
             <a:fld id="{F63ACD98-5124-4B8B-B052-6751B42D2BBE}" type="datetimeFigureOut">
               <a:rPr lang="en-GB" smtClean="0"/>
-              <a:t>29/01/2020</a:t>
+              <a:t>18/03/2020</a:t>
             </a:fld>
             <a:endParaRPr lang="en-GB"/>
           </a:p>
@@ -1830,7 +1830,7 @@
           <a:p>
             <a:fld id="{F63ACD98-5124-4B8B-B052-6751B42D2BBE}" type="datetimeFigureOut">
               <a:rPr lang="en-GB" smtClean="0"/>
-              <a:t>29/01/2020</a:t>
+              <a:t>18/03/2020</a:t>
             </a:fld>
             <a:endParaRPr lang="en-GB"/>
           </a:p>
@@ -1972,7 +1972,7 @@
           <a:p>
             <a:fld id="{F63ACD98-5124-4B8B-B052-6751B42D2BBE}" type="datetimeFigureOut">
               <a:rPr lang="en-GB" smtClean="0"/>
-              <a:t>29/01/2020</a:t>
+              <a:t>18/03/2020</a:t>
             </a:fld>
             <a:endParaRPr lang="en-GB"/>
           </a:p>
@@ -2085,7 +2085,7 @@
           <a:p>
             <a:fld id="{F63ACD98-5124-4B8B-B052-6751B42D2BBE}" type="datetimeFigureOut">
               <a:rPr lang="en-GB" smtClean="0"/>
-              <a:t>29/01/2020</a:t>
+              <a:t>18/03/2020</a:t>
             </a:fld>
             <a:endParaRPr lang="en-GB"/>
           </a:p>
@@ -2398,7 +2398,7 @@
           <a:p>
             <a:fld id="{F63ACD98-5124-4B8B-B052-6751B42D2BBE}" type="datetimeFigureOut">
               <a:rPr lang="en-GB" smtClean="0"/>
-              <a:t>29/01/2020</a:t>
+              <a:t>18/03/2020</a:t>
             </a:fld>
             <a:endParaRPr lang="en-GB"/>
           </a:p>
@@ -2687,7 +2687,7 @@
           <a:p>
             <a:fld id="{F63ACD98-5124-4B8B-B052-6751B42D2BBE}" type="datetimeFigureOut">
               <a:rPr lang="en-GB" smtClean="0"/>
-              <a:t>29/01/2020</a:t>
+              <a:t>18/03/2020</a:t>
             </a:fld>
             <a:endParaRPr lang="en-GB"/>
           </a:p>
@@ -2930,7 +2930,7 @@
           <a:p>
             <a:fld id="{F63ACD98-5124-4B8B-B052-6751B42D2BBE}" type="datetimeFigureOut">
               <a:rPr lang="en-GB" smtClean="0"/>
-              <a:t>29/01/2020</a:t>
+              <a:t>18/03/2020</a:t>
             </a:fld>
             <a:endParaRPr lang="en-GB"/>
           </a:p>
@@ -3362,7 +3362,7 @@
         <p:spPr>
           <a:xfrm>
             <a:off x="8926091" y="3084537"/>
-            <a:ext cx="2682817" cy="609606"/>
+            <a:ext cx="2682817" cy="632330"/>
           </a:xfrm>
           <a:prstGeom prst="rect">
             <a:avLst/>
@@ -3411,19 +3411,24 @@
           <a:prstGeom prst="rect">
             <a:avLst/>
           </a:prstGeom>
+          <a:solidFill>
+            <a:schemeClr val="accent1"/>
+          </a:solidFill>
         </p:spPr>
         <p:style>
           <a:lnRef idx="2">
-            <a:schemeClr val="accent1"/>
+            <a:schemeClr val="accent1">
+              <a:shade val="50000"/>
+            </a:schemeClr>
           </a:lnRef>
           <a:fillRef idx="1">
-            <a:schemeClr val="lt1"/>
+            <a:schemeClr val="accent1"/>
           </a:fillRef>
           <a:effectRef idx="0">
             <a:schemeClr val="accent1"/>
           </a:effectRef>
           <a:fontRef idx="minor">
-            <a:schemeClr val="dk1"/>
+            <a:schemeClr val="lt1"/>
           </a:fontRef>
         </p:style>
         <p:txBody>
@@ -3431,7 +3436,11 @@
           <a:lstStyle/>
           <a:p>
             <a:pPr algn="ctr"/>
-            <a:endParaRPr lang="en-GB" sz="1600" dirty="0"/>
+            <a:endParaRPr lang="en-GB" sz="1600" dirty="0">
+              <a:solidFill>
+                <a:schemeClr val="lt1"/>
+              </a:solidFill>
+            </a:endParaRPr>
           </a:p>
         </p:txBody>
       </p:sp>
@@ -3455,19 +3464,24 @@
           <a:prstGeom prst="rect">
             <a:avLst/>
           </a:prstGeom>
+          <a:solidFill>
+            <a:schemeClr val="accent1"/>
+          </a:solidFill>
         </p:spPr>
         <p:style>
           <a:lnRef idx="2">
-            <a:schemeClr val="accent1"/>
+            <a:schemeClr val="accent1">
+              <a:shade val="50000"/>
+            </a:schemeClr>
           </a:lnRef>
           <a:fillRef idx="1">
-            <a:schemeClr val="lt1"/>
+            <a:schemeClr val="accent1"/>
           </a:fillRef>
           <a:effectRef idx="0">
             <a:schemeClr val="accent1"/>
           </a:effectRef>
           <a:fontRef idx="minor">
-            <a:schemeClr val="dk1"/>
+            <a:schemeClr val="lt1"/>
           </a:fontRef>
         </p:style>
         <p:txBody>
@@ -3475,7 +3489,11 @@
           <a:lstStyle/>
           <a:p>
             <a:pPr algn="ctr"/>
-            <a:endParaRPr lang="en-GB" sz="1600" dirty="0"/>
+            <a:endParaRPr lang="en-GB" sz="1600" dirty="0">
+              <a:solidFill>
+                <a:schemeClr val="lt1"/>
+              </a:solidFill>
+            </a:endParaRPr>
           </a:p>
         </p:txBody>
       </p:sp>
@@ -3499,19 +3517,24 @@
           <a:prstGeom prst="rect">
             <a:avLst/>
           </a:prstGeom>
+          <a:solidFill>
+            <a:schemeClr val="accent1"/>
+          </a:solidFill>
         </p:spPr>
         <p:style>
           <a:lnRef idx="2">
-            <a:schemeClr val="accent1"/>
+            <a:schemeClr val="accent1">
+              <a:shade val="50000"/>
+            </a:schemeClr>
           </a:lnRef>
           <a:fillRef idx="1">
-            <a:schemeClr val="lt1"/>
+            <a:schemeClr val="accent1"/>
           </a:fillRef>
           <a:effectRef idx="0">
             <a:schemeClr val="accent1"/>
           </a:effectRef>
           <a:fontRef idx="minor">
-            <a:schemeClr val="dk1"/>
+            <a:schemeClr val="lt1"/>
           </a:fontRef>
         </p:style>
         <p:txBody>
@@ -3519,7 +3542,11 @@
           <a:lstStyle/>
           <a:p>
             <a:pPr algn="ctr"/>
-            <a:endParaRPr lang="en-GB" sz="1600" dirty="0"/>
+            <a:endParaRPr lang="en-GB" sz="1600" dirty="0">
+              <a:solidFill>
+                <a:schemeClr val="lt1"/>
+              </a:solidFill>
+            </a:endParaRPr>
           </a:p>
         </p:txBody>
       </p:sp>
@@ -3543,19 +3570,24 @@
           <a:prstGeom prst="rect">
             <a:avLst/>
           </a:prstGeom>
+          <a:solidFill>
+            <a:schemeClr val="accent1"/>
+          </a:solidFill>
         </p:spPr>
         <p:style>
           <a:lnRef idx="2">
-            <a:schemeClr val="accent1"/>
+            <a:schemeClr val="accent1">
+              <a:shade val="50000"/>
+            </a:schemeClr>
           </a:lnRef>
           <a:fillRef idx="1">
-            <a:schemeClr val="lt1"/>
+            <a:schemeClr val="accent1"/>
           </a:fillRef>
           <a:effectRef idx="0">
             <a:schemeClr val="accent1"/>
           </a:effectRef>
           <a:fontRef idx="minor">
-            <a:schemeClr val="dk1"/>
+            <a:schemeClr val="lt1"/>
           </a:fontRef>
         </p:style>
         <p:txBody>
@@ -3563,7 +3595,11 @@
           <a:lstStyle/>
           <a:p>
             <a:pPr algn="ctr"/>
-            <a:endParaRPr lang="en-GB" sz="1600" dirty="0"/>
+            <a:endParaRPr lang="en-GB" sz="1600" dirty="0">
+              <a:solidFill>
+                <a:schemeClr val="lt1"/>
+              </a:solidFill>
+            </a:endParaRPr>
           </a:p>
         </p:txBody>
       </p:sp>
@@ -4734,15 +4770,15 @@
         </p:spPr>
         <p:style>
           <a:lnRef idx="2">
-            <a:schemeClr val="accent1">
+            <a:schemeClr val="accent6">
               <a:shade val="50000"/>
             </a:schemeClr>
           </a:lnRef>
           <a:fillRef idx="1">
-            <a:schemeClr val="accent1"/>
+            <a:schemeClr val="accent6"/>
           </a:fillRef>
           <a:effectRef idx="0">
-            <a:schemeClr val="accent1"/>
+            <a:schemeClr val="accent6"/>
           </a:effectRef>
           <a:fontRef idx="minor">
             <a:schemeClr val="lt1"/>
@@ -4868,8 +4904,13 @@
             </a:r>
             <a:r>
               <a:rPr lang="en-GB" sz="1600" dirty="0"/>
-              <a:t>-testing-xxx</a:t>
-            </a:r>
+              <a:t>-testing-xxx-</a:t>
+            </a:r>
+            <a:r>
+              <a:rPr lang="en-GB" sz="1600" dirty="0" err="1"/>
+              <a:t>applib</a:t>
+            </a:r>
+            <a:endParaRPr lang="en-GB" sz="1600" dirty="0"/>
           </a:p>
         </p:txBody>
       </p:sp>

</xml_diff>

<commit_message>
ISIS-2965 : staging changes to website
</commit_message>
<xml_diff>
--- a/content/docs/latest/parent-pom/_attachments/parent-pom.pptx
+++ b/content/docs/latest/parent-pom/_attachments/parent-pom.pptx
@@ -261,7 +261,7 @@
           <a:p>
             <a:fld id="{F63ACD98-5124-4B8B-B052-6751B42D2BBE}" type="datetimeFigureOut">
               <a:rPr lang="en-GB" smtClean="0"/>
-              <a:t>18/03/2020</a:t>
+              <a:t>19/05/2022</a:t>
             </a:fld>
             <a:endParaRPr lang="en-GB"/>
           </a:p>
@@ -461,7 +461,7 @@
           <a:p>
             <a:fld id="{F63ACD98-5124-4B8B-B052-6751B42D2BBE}" type="datetimeFigureOut">
               <a:rPr lang="en-GB" smtClean="0"/>
-              <a:t>18/03/2020</a:t>
+              <a:t>19/05/2022</a:t>
             </a:fld>
             <a:endParaRPr lang="en-GB"/>
           </a:p>
@@ -671,7 +671,7 @@
           <a:p>
             <a:fld id="{F63ACD98-5124-4B8B-B052-6751B42D2BBE}" type="datetimeFigureOut">
               <a:rPr lang="en-GB" smtClean="0"/>
-              <a:t>18/03/2020</a:t>
+              <a:t>19/05/2022</a:t>
             </a:fld>
             <a:endParaRPr lang="en-GB"/>
           </a:p>
@@ -871,7 +871,7 @@
           <a:p>
             <a:fld id="{F63ACD98-5124-4B8B-B052-6751B42D2BBE}" type="datetimeFigureOut">
               <a:rPr lang="en-GB" smtClean="0"/>
-              <a:t>18/03/2020</a:t>
+              <a:t>19/05/2022</a:t>
             </a:fld>
             <a:endParaRPr lang="en-GB"/>
           </a:p>
@@ -1147,7 +1147,7 @@
           <a:p>
             <a:fld id="{F63ACD98-5124-4B8B-B052-6751B42D2BBE}" type="datetimeFigureOut">
               <a:rPr lang="en-GB" smtClean="0"/>
-              <a:t>18/03/2020</a:t>
+              <a:t>19/05/2022</a:t>
             </a:fld>
             <a:endParaRPr lang="en-GB"/>
           </a:p>
@@ -1415,7 +1415,7 @@
           <a:p>
             <a:fld id="{F63ACD98-5124-4B8B-B052-6751B42D2BBE}" type="datetimeFigureOut">
               <a:rPr lang="en-GB" smtClean="0"/>
-              <a:t>18/03/2020</a:t>
+              <a:t>19/05/2022</a:t>
             </a:fld>
             <a:endParaRPr lang="en-GB"/>
           </a:p>
@@ -1830,7 +1830,7 @@
           <a:p>
             <a:fld id="{F63ACD98-5124-4B8B-B052-6751B42D2BBE}" type="datetimeFigureOut">
               <a:rPr lang="en-GB" smtClean="0"/>
-              <a:t>18/03/2020</a:t>
+              <a:t>19/05/2022</a:t>
             </a:fld>
             <a:endParaRPr lang="en-GB"/>
           </a:p>
@@ -1972,7 +1972,7 @@
           <a:p>
             <a:fld id="{F63ACD98-5124-4B8B-B052-6751B42D2BBE}" type="datetimeFigureOut">
               <a:rPr lang="en-GB" smtClean="0"/>
-              <a:t>18/03/2020</a:t>
+              <a:t>19/05/2022</a:t>
             </a:fld>
             <a:endParaRPr lang="en-GB"/>
           </a:p>
@@ -2085,7 +2085,7 @@
           <a:p>
             <a:fld id="{F63ACD98-5124-4B8B-B052-6751B42D2BBE}" type="datetimeFigureOut">
               <a:rPr lang="en-GB" smtClean="0"/>
-              <a:t>18/03/2020</a:t>
+              <a:t>19/05/2022</a:t>
             </a:fld>
             <a:endParaRPr lang="en-GB"/>
           </a:p>
@@ -2398,7 +2398,7 @@
           <a:p>
             <a:fld id="{F63ACD98-5124-4B8B-B052-6751B42D2BBE}" type="datetimeFigureOut">
               <a:rPr lang="en-GB" smtClean="0"/>
-              <a:t>18/03/2020</a:t>
+              <a:t>19/05/2022</a:t>
             </a:fld>
             <a:endParaRPr lang="en-GB"/>
           </a:p>
@@ -2687,7 +2687,7 @@
           <a:p>
             <a:fld id="{F63ACD98-5124-4B8B-B052-6751B42D2BBE}" type="datetimeFigureOut">
               <a:rPr lang="en-GB" smtClean="0"/>
-              <a:t>18/03/2020</a:t>
+              <a:t>19/05/2022</a:t>
             </a:fld>
             <a:endParaRPr lang="en-GB"/>
           </a:p>
@@ -2930,7 +2930,7 @@
           <a:p>
             <a:fld id="{F63ACD98-5124-4B8B-B052-6751B42D2BBE}" type="datetimeFigureOut">
               <a:rPr lang="en-GB" smtClean="0"/>
-              <a:t>18/03/2020</a:t>
+              <a:t>19/05/2022</a:t>
             </a:fld>
             <a:endParaRPr lang="en-GB"/>
           </a:p>
@@ -3851,7 +3851,7 @@
         </p:nvSpPr>
         <p:spPr>
           <a:xfrm>
-            <a:off x="9173122" y="4047805"/>
+            <a:off x="7161449" y="4047805"/>
             <a:ext cx="2682817" cy="609606"/>
           </a:xfrm>
           <a:prstGeom prst="rect">
@@ -4319,8 +4319,8 @@
         </p:nvCxnSpPr>
         <p:spPr>
           <a:xfrm rot="16200000" flipV="1">
-            <a:off x="7118224" y="651497"/>
-            <a:ext cx="456234" cy="6336381"/>
+            <a:off x="6112387" y="1657334"/>
+            <a:ext cx="456234" cy="4324708"/>
           </a:xfrm>
           <a:prstGeom prst="curvedConnector3">
             <a:avLst>
@@ -4509,7 +4509,7 @@
         </p:nvSpPr>
         <p:spPr>
           <a:xfrm>
-            <a:off x="6692259" y="5200791"/>
+            <a:off x="7671965" y="5076697"/>
             <a:ext cx="1658054" cy="611410"/>
           </a:xfrm>
           <a:prstGeom prst="rect">
@@ -4547,10 +4547,102 @@
       </p:sp>
       <p:sp>
         <p:nvSpPr>
-          <p:cNvPr id="40" name="Rectangle 39">
-            <a:extLst>
-              <a:ext uri="{FF2B5EF4-FFF2-40B4-BE49-F238E27FC236}">
-                <a16:creationId xmlns:a16="http://schemas.microsoft.com/office/drawing/2014/main" id="{F1D4BDFC-E2EA-4B58-B3F4-941B25BF6F63}"/>
+          <p:cNvPr id="48" name="TextBox 47">
+            <a:extLst>
+              <a:ext uri="{FF2B5EF4-FFF2-40B4-BE49-F238E27FC236}">
+                <a16:creationId xmlns:a16="http://schemas.microsoft.com/office/drawing/2014/main" id="{2427A187-773B-4C23-B9FB-9694C34727E3}"/>
+              </a:ext>
+            </a:extLst>
+          </p:cNvPr>
+          <p:cNvSpPr txBox="1"/>
+          <p:nvPr/>
+        </p:nvSpPr>
+        <p:spPr>
+          <a:xfrm>
+            <a:off x="2319191" y="980935"/>
+            <a:ext cx="2435431" cy="584775"/>
+          </a:xfrm>
+          <a:prstGeom prst="rect">
+            <a:avLst/>
+          </a:prstGeom>
+          <a:noFill/>
+        </p:spPr>
+        <p:txBody>
+          <a:bodyPr wrap="square" rtlCol="0">
+            <a:spAutoFit/>
+          </a:bodyPr>
+          <a:lstStyle/>
+          <a:p>
+            <a:pPr algn="ctr"/>
+            <a:r>
+              <a:rPr lang="en-GB" sz="1600" dirty="0"/>
+              <a:t>build/resources</a:t>
+            </a:r>
+            <a:br>
+              <a:rPr lang="en-GB" sz="1600" dirty="0"/>
+            </a:br>
+            <a:r>
+              <a:rPr lang="en-GB" sz="1600" dirty="0"/>
+              <a:t>build/</a:t>
+            </a:r>
+            <a:r>
+              <a:rPr lang="en-GB" sz="1600" dirty="0" err="1"/>
+              <a:t>pluginManagement</a:t>
+            </a:r>
+            <a:endParaRPr lang="en-GB" sz="1600" dirty="0"/>
+          </a:p>
+        </p:txBody>
+      </p:sp>
+      <p:sp>
+        <p:nvSpPr>
+          <p:cNvPr id="49" name="TextBox 48">
+            <a:extLst>
+              <a:ext uri="{FF2B5EF4-FFF2-40B4-BE49-F238E27FC236}">
+                <a16:creationId xmlns:a16="http://schemas.microsoft.com/office/drawing/2014/main" id="{EA2129F9-66F3-45BF-BCDD-756CEE87AEF5}"/>
+              </a:ext>
+            </a:extLst>
+          </p:cNvPr>
+          <p:cNvSpPr txBox="1"/>
+          <p:nvPr/>
+        </p:nvSpPr>
+        <p:spPr>
+          <a:xfrm>
+            <a:off x="2377503" y="200645"/>
+            <a:ext cx="2435431" cy="584775"/>
+          </a:xfrm>
+          <a:prstGeom prst="rect">
+            <a:avLst/>
+          </a:prstGeom>
+          <a:noFill/>
+        </p:spPr>
+        <p:txBody>
+          <a:bodyPr wrap="square" rtlCol="0">
+            <a:spAutoFit/>
+          </a:bodyPr>
+          <a:lstStyle/>
+          <a:p>
+            <a:pPr algn="ctr"/>
+            <a:r>
+              <a:rPr lang="en-GB" sz="1600" dirty="0"/>
+              <a:t>version properties</a:t>
+            </a:r>
+            <a:br>
+              <a:rPr lang="en-GB" sz="1600" dirty="0"/>
+            </a:br>
+            <a:r>
+              <a:rPr lang="en-GB" sz="1600" dirty="0" err="1"/>
+              <a:t>dependencyManagement</a:t>
+            </a:r>
+            <a:endParaRPr lang="en-GB" sz="1600" dirty="0"/>
+          </a:p>
+        </p:txBody>
+      </p:sp>
+      <p:sp>
+        <p:nvSpPr>
+          <p:cNvPr id="59" name="Rectangle 58">
+            <a:extLst>
+              <a:ext uri="{FF2B5EF4-FFF2-40B4-BE49-F238E27FC236}">
+                <a16:creationId xmlns:a16="http://schemas.microsoft.com/office/drawing/2014/main" id="{52CDD9D2-1304-4511-9F14-05B48A018636}"/>
               </a:ext>
             </a:extLst>
           </p:cNvPr>
@@ -4559,8 +4651,8 @@
         </p:nvSpPr>
         <p:spPr>
           <a:xfrm>
-            <a:off x="8572815" y="5200790"/>
-            <a:ext cx="1658054" cy="611410"/>
+            <a:off x="419304" y="4053022"/>
+            <a:ext cx="2682817" cy="609606"/>
           </a:xfrm>
           <a:prstGeom prst="rect">
             <a:avLst/>
@@ -4589,29 +4681,70 @@
             <a:pPr algn="ctr"/>
             <a:r>
               <a:rPr lang="en-GB" sz="1600" dirty="0" err="1"/>
-              <a:t>isis</a:t>
-            </a:r>
-            <a:r>
+              <a:t>org.apache.isis.core</a:t>
+            </a:r>
+            <a:br>
               <a:rPr lang="en-GB" sz="1600" dirty="0"/>
-              <a:t>-</a:t>
-            </a:r>
+            </a:br>
             <a:r>
               <a:rPr lang="en-GB" sz="1600" dirty="0" err="1"/>
-              <a:t>mavendeps</a:t>
-            </a:r>
-            <a:r>
-              <a:rPr lang="en-GB" sz="1600" dirty="0"/>
-              <a:t>-testing</a:t>
-            </a:r>
-          </a:p>
-        </p:txBody>
-      </p:sp>
-      <p:sp>
-        <p:nvSpPr>
-          <p:cNvPr id="41" name="Rectangle 40">
-            <a:extLst>
-              <a:ext uri="{FF2B5EF4-FFF2-40B4-BE49-F238E27FC236}">
-                <a16:creationId xmlns:a16="http://schemas.microsoft.com/office/drawing/2014/main" id="{629E7F03-892F-4E4C-A34D-E605388C98FA}"/>
+              <a:t>isis-applib</a:t>
+            </a:r>
+            <a:endParaRPr lang="en-GB" sz="1600" dirty="0"/>
+          </a:p>
+        </p:txBody>
+      </p:sp>
+      <p:cxnSp>
+        <p:nvCxnSpPr>
+          <p:cNvPr id="65" name="Connector: Curved 64">
+            <a:extLst>
+              <a:ext uri="{FF2B5EF4-FFF2-40B4-BE49-F238E27FC236}">
+                <a16:creationId xmlns:a16="http://schemas.microsoft.com/office/drawing/2014/main" id="{870B8B07-9210-4DDB-86A6-F2F82426407F}"/>
+              </a:ext>
+            </a:extLst>
+          </p:cNvPr>
+          <p:cNvCxnSpPr>
+            <a:cxnSpLocks/>
+            <a:stCxn id="59" idx="0"/>
+            <a:endCxn id="9" idx="2"/>
+          </p:cNvCxnSpPr>
+          <p:nvPr/>
+        </p:nvCxnSpPr>
+        <p:spPr>
+          <a:xfrm rot="5400000" flipH="1" flipV="1">
+            <a:off x="2738706" y="2613579"/>
+            <a:ext cx="461451" cy="2417437"/>
+          </a:xfrm>
+          <a:prstGeom prst="curvedConnector3">
+            <a:avLst>
+              <a:gd name="adj1" fmla="val 50000"/>
+            </a:avLst>
+          </a:prstGeom>
+          <a:ln w="15875">
+            <a:tailEnd type="triangle" w="lg" len="lg"/>
+          </a:ln>
+        </p:spPr>
+        <p:style>
+          <a:lnRef idx="1">
+            <a:schemeClr val="accent1"/>
+          </a:lnRef>
+          <a:fillRef idx="0">
+            <a:schemeClr val="accent1"/>
+          </a:fillRef>
+          <a:effectRef idx="0">
+            <a:schemeClr val="accent1"/>
+          </a:effectRef>
+          <a:fontRef idx="minor">
+            <a:schemeClr val="tx1"/>
+          </a:fontRef>
+        </p:style>
+      </p:cxnSp>
+      <p:sp>
+        <p:nvSpPr>
+          <p:cNvPr id="71" name="Rectangle 70">
+            <a:extLst>
+              <a:ext uri="{FF2B5EF4-FFF2-40B4-BE49-F238E27FC236}">
+                <a16:creationId xmlns:a16="http://schemas.microsoft.com/office/drawing/2014/main" id="{A2C0FA4B-EEA3-43C7-800F-F70B061E16DE}"/>
               </a:ext>
             </a:extLst>
           </p:cNvPr>
@@ -4620,8 +4753,8 @@
         </p:nvSpPr>
         <p:spPr>
           <a:xfrm>
-            <a:off x="10417313" y="5200790"/>
-            <a:ext cx="1658054" cy="611410"/>
+            <a:off x="3489574" y="5016315"/>
+            <a:ext cx="2690757" cy="611410"/>
           </a:xfrm>
           <a:prstGeom prst="rect">
             <a:avLst/>
@@ -4649,249 +4782,6 @@
           <a:p>
             <a:pPr algn="ctr"/>
             <a:r>
-              <a:rPr lang="en-GB" sz="1600" dirty="0"/>
-              <a:t>isis-mavendeps-jdk11</a:t>
-            </a:r>
-          </a:p>
-        </p:txBody>
-      </p:sp>
-      <p:sp>
-        <p:nvSpPr>
-          <p:cNvPr id="48" name="TextBox 47">
-            <a:extLst>
-              <a:ext uri="{FF2B5EF4-FFF2-40B4-BE49-F238E27FC236}">
-                <a16:creationId xmlns:a16="http://schemas.microsoft.com/office/drawing/2014/main" id="{2427A187-773B-4C23-B9FB-9694C34727E3}"/>
-              </a:ext>
-            </a:extLst>
-          </p:cNvPr>
-          <p:cNvSpPr txBox="1"/>
-          <p:nvPr/>
-        </p:nvSpPr>
-        <p:spPr>
-          <a:xfrm>
-            <a:off x="2319191" y="980935"/>
-            <a:ext cx="2435431" cy="584775"/>
-          </a:xfrm>
-          <a:prstGeom prst="rect">
-            <a:avLst/>
-          </a:prstGeom>
-          <a:noFill/>
-        </p:spPr>
-        <p:txBody>
-          <a:bodyPr wrap="square" rtlCol="0">
-            <a:spAutoFit/>
-          </a:bodyPr>
-          <a:lstStyle/>
-          <a:p>
-            <a:pPr algn="ctr"/>
-            <a:r>
-              <a:rPr lang="en-GB" sz="1600" dirty="0"/>
-              <a:t>build/resources</a:t>
-            </a:r>
-            <a:br>
-              <a:rPr lang="en-GB" sz="1600" dirty="0"/>
-            </a:br>
-            <a:r>
-              <a:rPr lang="en-GB" sz="1600" dirty="0"/>
-              <a:t>build/</a:t>
-            </a:r>
-            <a:r>
-              <a:rPr lang="en-GB" sz="1600" dirty="0" err="1"/>
-              <a:t>pluginManagement</a:t>
-            </a:r>
-            <a:endParaRPr lang="en-GB" sz="1600" dirty="0"/>
-          </a:p>
-        </p:txBody>
-      </p:sp>
-      <p:sp>
-        <p:nvSpPr>
-          <p:cNvPr id="49" name="TextBox 48">
-            <a:extLst>
-              <a:ext uri="{FF2B5EF4-FFF2-40B4-BE49-F238E27FC236}">
-                <a16:creationId xmlns:a16="http://schemas.microsoft.com/office/drawing/2014/main" id="{EA2129F9-66F3-45BF-BCDD-756CEE87AEF5}"/>
-              </a:ext>
-            </a:extLst>
-          </p:cNvPr>
-          <p:cNvSpPr txBox="1"/>
-          <p:nvPr/>
-        </p:nvSpPr>
-        <p:spPr>
-          <a:xfrm>
-            <a:off x="2377503" y="200645"/>
-            <a:ext cx="2435431" cy="584775"/>
-          </a:xfrm>
-          <a:prstGeom prst="rect">
-            <a:avLst/>
-          </a:prstGeom>
-          <a:noFill/>
-        </p:spPr>
-        <p:txBody>
-          <a:bodyPr wrap="square" rtlCol="0">
-            <a:spAutoFit/>
-          </a:bodyPr>
-          <a:lstStyle/>
-          <a:p>
-            <a:pPr algn="ctr"/>
-            <a:r>
-              <a:rPr lang="en-GB" sz="1600" dirty="0"/>
-              <a:t>version properties</a:t>
-            </a:r>
-            <a:br>
-              <a:rPr lang="en-GB" sz="1600" dirty="0"/>
-            </a:br>
-            <a:r>
-              <a:rPr lang="en-GB" sz="1600" dirty="0" err="1"/>
-              <a:t>dependencyManagement</a:t>
-            </a:r>
-            <a:endParaRPr lang="en-GB" sz="1600" dirty="0"/>
-          </a:p>
-        </p:txBody>
-      </p:sp>
-      <p:sp>
-        <p:nvSpPr>
-          <p:cNvPr id="59" name="Rectangle 58">
-            <a:extLst>
-              <a:ext uri="{FF2B5EF4-FFF2-40B4-BE49-F238E27FC236}">
-                <a16:creationId xmlns:a16="http://schemas.microsoft.com/office/drawing/2014/main" id="{52CDD9D2-1304-4511-9F14-05B48A018636}"/>
-              </a:ext>
-            </a:extLst>
-          </p:cNvPr>
-          <p:cNvSpPr/>
-          <p:nvPr/>
-        </p:nvSpPr>
-        <p:spPr>
-          <a:xfrm>
-            <a:off x="419304" y="4053022"/>
-            <a:ext cx="2682817" cy="609606"/>
-          </a:xfrm>
-          <a:prstGeom prst="rect">
-            <a:avLst/>
-          </a:prstGeom>
-        </p:spPr>
-        <p:style>
-          <a:lnRef idx="2">
-            <a:schemeClr val="accent6">
-              <a:shade val="50000"/>
-            </a:schemeClr>
-          </a:lnRef>
-          <a:fillRef idx="1">
-            <a:schemeClr val="accent6"/>
-          </a:fillRef>
-          <a:effectRef idx="0">
-            <a:schemeClr val="accent6"/>
-          </a:effectRef>
-          <a:fontRef idx="minor">
-            <a:schemeClr val="lt1"/>
-          </a:fontRef>
-        </p:style>
-        <p:txBody>
-          <a:bodyPr rtlCol="0" anchor="ctr"/>
-          <a:lstStyle/>
-          <a:p>
-            <a:pPr algn="ctr"/>
-            <a:r>
-              <a:rPr lang="en-GB" sz="1600" dirty="0" err="1"/>
-              <a:t>org.apache.isis.core</a:t>
-            </a:r>
-            <a:br>
-              <a:rPr lang="en-GB" sz="1600" dirty="0"/>
-            </a:br>
-            <a:r>
-              <a:rPr lang="en-GB" sz="1600" dirty="0" err="1"/>
-              <a:t>isis-applib</a:t>
-            </a:r>
-            <a:endParaRPr lang="en-GB" sz="1600" dirty="0"/>
-          </a:p>
-        </p:txBody>
-      </p:sp>
-      <p:cxnSp>
-        <p:nvCxnSpPr>
-          <p:cNvPr id="65" name="Connector: Curved 64">
-            <a:extLst>
-              <a:ext uri="{FF2B5EF4-FFF2-40B4-BE49-F238E27FC236}">
-                <a16:creationId xmlns:a16="http://schemas.microsoft.com/office/drawing/2014/main" id="{870B8B07-9210-4DDB-86A6-F2F82426407F}"/>
-              </a:ext>
-            </a:extLst>
-          </p:cNvPr>
-          <p:cNvCxnSpPr>
-            <a:cxnSpLocks/>
-            <a:stCxn id="59" idx="0"/>
-            <a:endCxn id="9" idx="2"/>
-          </p:cNvCxnSpPr>
-          <p:nvPr/>
-        </p:nvCxnSpPr>
-        <p:spPr>
-          <a:xfrm rot="5400000" flipH="1" flipV="1">
-            <a:off x="2738706" y="2613579"/>
-            <a:ext cx="461451" cy="2417437"/>
-          </a:xfrm>
-          <a:prstGeom prst="curvedConnector3">
-            <a:avLst>
-              <a:gd name="adj1" fmla="val 50000"/>
-            </a:avLst>
-          </a:prstGeom>
-          <a:ln w="15875">
-            <a:tailEnd type="triangle" w="lg" len="lg"/>
-          </a:ln>
-        </p:spPr>
-        <p:style>
-          <a:lnRef idx="1">
-            <a:schemeClr val="accent1"/>
-          </a:lnRef>
-          <a:fillRef idx="0">
-            <a:schemeClr val="accent1"/>
-          </a:fillRef>
-          <a:effectRef idx="0">
-            <a:schemeClr val="accent1"/>
-          </a:effectRef>
-          <a:fontRef idx="minor">
-            <a:schemeClr val="tx1"/>
-          </a:fontRef>
-        </p:style>
-      </p:cxnSp>
-      <p:sp>
-        <p:nvSpPr>
-          <p:cNvPr id="71" name="Rectangle 70">
-            <a:extLst>
-              <a:ext uri="{FF2B5EF4-FFF2-40B4-BE49-F238E27FC236}">
-                <a16:creationId xmlns:a16="http://schemas.microsoft.com/office/drawing/2014/main" id="{A2C0FA4B-EEA3-43C7-800F-F70B061E16DE}"/>
-              </a:ext>
-            </a:extLst>
-          </p:cNvPr>
-          <p:cNvSpPr/>
-          <p:nvPr/>
-        </p:nvSpPr>
-        <p:spPr>
-          <a:xfrm>
-            <a:off x="3489574" y="5016315"/>
-            <a:ext cx="2690757" cy="611410"/>
-          </a:xfrm>
-          <a:prstGeom prst="rect">
-            <a:avLst/>
-          </a:prstGeom>
-        </p:spPr>
-        <p:style>
-          <a:lnRef idx="2">
-            <a:schemeClr val="accent6">
-              <a:shade val="50000"/>
-            </a:schemeClr>
-          </a:lnRef>
-          <a:fillRef idx="1">
-            <a:schemeClr val="accent6"/>
-          </a:fillRef>
-          <a:effectRef idx="0">
-            <a:schemeClr val="accent6"/>
-          </a:effectRef>
-          <a:fontRef idx="minor">
-            <a:schemeClr val="lt1"/>
-          </a:fontRef>
-        </p:style>
-        <p:txBody>
-          <a:bodyPr rtlCol="0" anchor="ctr"/>
-          <a:lstStyle/>
-          <a:p>
-            <a:pPr algn="ctr"/>
-            <a:r>
               <a:rPr lang="en-GB" sz="1600" dirty="0" err="1"/>
               <a:t>org.apache.isis.testing</a:t>
             </a:r>
@@ -4977,98 +4867,8 @@
         </p:nvCxnSpPr>
         <p:spPr>
           <a:xfrm rot="5400000" flipH="1" flipV="1">
-            <a:off x="8746218" y="3432479"/>
-            <a:ext cx="543380" cy="2993245"/>
-          </a:xfrm>
-          <a:prstGeom prst="curvedConnector3">
-            <a:avLst>
-              <a:gd name="adj1" fmla="val 50000"/>
-            </a:avLst>
-          </a:prstGeom>
-          <a:ln w="15875">
-            <a:tailEnd type="triangle" w="lg" len="lg"/>
-          </a:ln>
-        </p:spPr>
-        <p:style>
-          <a:lnRef idx="1">
-            <a:schemeClr val="accent1"/>
-          </a:lnRef>
-          <a:fillRef idx="0">
-            <a:schemeClr val="accent1"/>
-          </a:fillRef>
-          <a:effectRef idx="0">
-            <a:schemeClr val="accent1"/>
-          </a:effectRef>
-          <a:fontRef idx="minor">
-            <a:schemeClr val="tx1"/>
-          </a:fontRef>
-        </p:style>
-      </p:cxnSp>
-      <p:cxnSp>
-        <p:nvCxnSpPr>
-          <p:cNvPr id="81" name="Connector: Curved 80">
-            <a:extLst>
-              <a:ext uri="{FF2B5EF4-FFF2-40B4-BE49-F238E27FC236}">
-                <a16:creationId xmlns:a16="http://schemas.microsoft.com/office/drawing/2014/main" id="{54726815-FC91-42F3-B404-12CA0912092B}"/>
-              </a:ext>
-            </a:extLst>
-          </p:cNvPr>
-          <p:cNvCxnSpPr>
-            <a:cxnSpLocks/>
-            <a:stCxn id="40" idx="0"/>
-            <a:endCxn id="10" idx="2"/>
-          </p:cNvCxnSpPr>
-          <p:nvPr/>
-        </p:nvCxnSpPr>
-        <p:spPr>
-          <a:xfrm rot="5400000" flipH="1" flipV="1">
-            <a:off x="9686497" y="4372757"/>
-            <a:ext cx="543379" cy="1112689"/>
-          </a:xfrm>
-          <a:prstGeom prst="curvedConnector3">
-            <a:avLst>
-              <a:gd name="adj1" fmla="val 50000"/>
-            </a:avLst>
-          </a:prstGeom>
-          <a:ln w="15875">
-            <a:tailEnd type="triangle" w="lg" len="lg"/>
-          </a:ln>
-        </p:spPr>
-        <p:style>
-          <a:lnRef idx="1">
-            <a:schemeClr val="accent1"/>
-          </a:lnRef>
-          <a:fillRef idx="0">
-            <a:schemeClr val="accent1"/>
-          </a:fillRef>
-          <a:effectRef idx="0">
-            <a:schemeClr val="accent1"/>
-          </a:effectRef>
-          <a:fontRef idx="minor">
-            <a:schemeClr val="tx1"/>
-          </a:fontRef>
-        </p:style>
-      </p:cxnSp>
-      <p:cxnSp>
-        <p:nvCxnSpPr>
-          <p:cNvPr id="84" name="Connector: Curved 83">
-            <a:extLst>
-              <a:ext uri="{FF2B5EF4-FFF2-40B4-BE49-F238E27FC236}">
-                <a16:creationId xmlns:a16="http://schemas.microsoft.com/office/drawing/2014/main" id="{E4F71E7E-DC14-44F3-AD58-437A21161AE2}"/>
-              </a:ext>
-            </a:extLst>
-          </p:cNvPr>
-          <p:cNvCxnSpPr>
-            <a:cxnSpLocks/>
-            <a:stCxn id="41" idx="0"/>
-            <a:endCxn id="10" idx="2"/>
-          </p:cNvCxnSpPr>
-          <p:nvPr/>
-        </p:nvCxnSpPr>
-        <p:spPr>
-          <a:xfrm rot="16200000" flipV="1">
-            <a:off x="10608747" y="4563196"/>
-            <a:ext cx="543379" cy="731809"/>
+            <a:off x="8292282" y="4866121"/>
+            <a:ext cx="419286" cy="1866"/>
           </a:xfrm>
           <a:prstGeom prst="curvedConnector3">
             <a:avLst>
@@ -5152,7 +4952,7 @@
         </p:nvSpPr>
         <p:spPr>
           <a:xfrm>
-            <a:off x="6259374" y="5866874"/>
+            <a:off x="8898055" y="4998201"/>
             <a:ext cx="2583807" cy="833456"/>
           </a:xfrm>
           <a:prstGeom prst="rect">
@@ -5184,101 +4984,6 @@
             <a:r>
               <a:rPr lang="en-GB" sz="1600" dirty="0"/>
               <a:t>dependencies</a:t>
-            </a:r>
-            <a:endParaRPr lang="en-GB" sz="1200" i="1" dirty="0"/>
-          </a:p>
-        </p:txBody>
-      </p:sp>
-      <p:sp>
-        <p:nvSpPr>
-          <p:cNvPr id="110" name="TextBox 109">
-            <a:extLst>
-              <a:ext uri="{FF2B5EF4-FFF2-40B4-BE49-F238E27FC236}">
-                <a16:creationId xmlns:a16="http://schemas.microsoft.com/office/drawing/2014/main" id="{EC93BB4F-620F-4F6F-A5D0-01E16DF5508C}"/>
-              </a:ext>
-            </a:extLst>
-          </p:cNvPr>
-          <p:cNvSpPr txBox="1"/>
-          <p:nvPr/>
-        </p:nvSpPr>
-        <p:spPr>
-          <a:xfrm>
-            <a:off x="8059418" y="5863999"/>
-            <a:ext cx="2583807" cy="833456"/>
-          </a:xfrm>
-          <a:prstGeom prst="rect">
-            <a:avLst/>
-          </a:prstGeom>
-          <a:noFill/>
-        </p:spPr>
-        <p:txBody>
-          <a:bodyPr wrap="square" rtlCol="0">
-            <a:spAutoFit/>
-          </a:bodyPr>
-          <a:lstStyle/>
-          <a:p>
-            <a:pPr algn="ctr"/>
-            <a:r>
-              <a:rPr lang="en-GB" sz="1600" dirty="0"/>
-              <a:t>Convenience pom</a:t>
-            </a:r>
-            <a:br>
-              <a:rPr lang="en-GB" sz="1600" dirty="0"/>
-            </a:br>
-            <a:r>
-              <a:rPr lang="en-GB" sz="1600" dirty="0"/>
-              <a:t>transitive test</a:t>
-            </a:r>
-            <a:br>
-              <a:rPr lang="en-GB" sz="1600" dirty="0"/>
-            </a:br>
-            <a:r>
-              <a:rPr lang="en-GB" sz="1600" dirty="0"/>
-              <a:t>dependencies</a:t>
-            </a:r>
-            <a:endParaRPr lang="en-GB" sz="1200" i="1" dirty="0"/>
-          </a:p>
-        </p:txBody>
-      </p:sp>
-      <p:sp>
-        <p:nvSpPr>
-          <p:cNvPr id="111" name="TextBox 110">
-            <a:extLst>
-              <a:ext uri="{FF2B5EF4-FFF2-40B4-BE49-F238E27FC236}">
-                <a16:creationId xmlns:a16="http://schemas.microsoft.com/office/drawing/2014/main" id="{FF54AD27-7C78-42E7-A357-9251C051C790}"/>
-              </a:ext>
-            </a:extLst>
-          </p:cNvPr>
-          <p:cNvSpPr txBox="1"/>
-          <p:nvPr/>
-        </p:nvSpPr>
-        <p:spPr>
-          <a:xfrm>
-            <a:off x="10342540" y="6001607"/>
-            <a:ext cx="1856722" cy="584775"/>
-          </a:xfrm>
-          <a:prstGeom prst="rect">
-            <a:avLst/>
-          </a:prstGeom>
-          <a:noFill/>
-        </p:spPr>
-        <p:txBody>
-          <a:bodyPr wrap="square" rtlCol="0">
-            <a:spAutoFit/>
-          </a:bodyPr>
-          <a:lstStyle/>
-          <a:p>
-            <a:pPr algn="ctr"/>
-            <a:r>
-              <a:rPr lang="en-GB" sz="1600" dirty="0"/>
-              <a:t>Convenience pom</a:t>
-            </a:r>
-            <a:br>
-              <a:rPr lang="en-GB" sz="1600" dirty="0"/>
-            </a:br>
-            <a:r>
-              <a:rPr lang="en-GB" sz="1600" dirty="0"/>
-              <a:t>if on JDK11+</a:t>
             </a:r>
             <a:endParaRPr lang="en-GB" sz="1200" i="1" dirty="0"/>
           </a:p>
@@ -6372,7 +6077,7 @@
         <p:spPr>
           <a:xfrm>
             <a:off x="9404679" y="74985"/>
-            <a:ext cx="2721133" cy="1015663"/>
+            <a:ext cx="2721133" cy="646331"/>
           </a:xfrm>
           <a:prstGeom prst="rect">
             <a:avLst/>
@@ -6414,7 +6119,7 @@
                   </a:schemeClr>
                 </a:solidFill>
               </a:rPr>
-              <a:t>o.a.i.subdomains</a:t>
+              <a:t>o.a.i.valuetypes</a:t>
             </a:r>
             <a:r>
               <a:rPr lang="en-GB" sz="1200" dirty="0">
@@ -6424,47 +6129,7 @@
                   </a:schemeClr>
                 </a:solidFill>
               </a:rPr>
-              <a:t>, </a:t>
-            </a:r>
-            <a:r>
-              <a:rPr lang="en-GB" sz="1200" dirty="0" err="1">
-                <a:solidFill>
-                  <a:schemeClr val="accent1">
-                    <a:lumMod val="75000"/>
-                  </a:schemeClr>
-                </a:solidFill>
-              </a:rPr>
-              <a:t>o.a.i.mappings</a:t>
-            </a:r>
-            <a:r>
-              <a:rPr lang="en-GB" sz="1200" dirty="0">
-                <a:solidFill>
-                  <a:schemeClr val="accent1">
-                    <a:lumMod val="75000"/>
-                  </a:schemeClr>
-                </a:solidFill>
-              </a:rPr>
-              <a:t>, </a:t>
-            </a:r>
-            <a:r>
-              <a:rPr lang="en-GB" sz="1200" dirty="0" err="1">
-                <a:solidFill>
-                  <a:schemeClr val="accent1">
-                    <a:lumMod val="75000"/>
-                  </a:schemeClr>
-                </a:solidFill>
-              </a:rPr>
-              <a:t>o.a.i.valuetypes</a:t>
-            </a:r>
-            <a:r>
-              <a:rPr lang="en-GB" sz="1200" dirty="0">
-                <a:solidFill>
-                  <a:schemeClr val="accent1">
-                    <a:lumMod val="75000"/>
-                  </a:schemeClr>
-                </a:solidFill>
-              </a:rPr>
-              <a:t>, </a:t>
+              <a:t> and  </a:t>
             </a:r>
             <a:r>
               <a:rPr lang="en-GB" sz="1200" dirty="0" err="1">
@@ -6475,26 +6140,6 @@
                 </a:solidFill>
               </a:rPr>
               <a:t>o.a.i.incubator</a:t>
-            </a:r>
-            <a:r>
-              <a:rPr lang="en-GB" sz="1200" dirty="0">
-                <a:solidFill>
-                  <a:schemeClr val="accent1">
-                    <a:lumMod val="75000"/>
-                  </a:schemeClr>
-                </a:solidFill>
-              </a:rPr>
-              <a:t> and </a:t>
-            </a:r>
-            <a:r>
-              <a:rPr lang="en-GB" sz="1200" dirty="0" err="1">
-                <a:solidFill>
-                  <a:schemeClr val="accent1">
-                    <a:lumMod val="75000"/>
-                  </a:schemeClr>
-                </a:solidFill>
-              </a:rPr>
-              <a:t>o.a.i.legacy</a:t>
             </a:r>
             <a:r>
               <a:rPr lang="en-GB" sz="1200" dirty="0">

</xml_diff>